<commit_message>
made slight modifications to the file
</commit_message>
<xml_diff>
--- a/US Housing Affordability.pptx
+++ b/US Housing Affordability.pptx
@@ -7199,7 +7199,7 @@
         <p:spPr>
           <a:xfrm flipH="1" flipV="1">
             <a:off x="2884602" y="4906654"/>
-            <a:ext cx="5448691" cy="2"/>
+            <a:ext cx="5448690" cy="2"/>
           </a:xfrm>
           <a:prstGeom prst="straightConnector1">
             <a:avLst/>
@@ -7284,8 +7284,8 @@
         </p:nvSpPr>
         <p:spPr>
           <a:xfrm>
-            <a:off x="8333293" y="4605525"/>
-            <a:ext cx="1923068" cy="602261"/>
+            <a:off x="8333292" y="4605525"/>
+            <a:ext cx="3307017" cy="602261"/>
           </a:xfrm>
           <a:prstGeom prst="rect">
             <a:avLst/>
@@ -7314,17 +7314,16 @@
           </a:fontRef>
         </p:style>
         <p:txBody>
-          <a:bodyPr rtlCol="0" anchor="ctr"/>
+          <a:bodyPr lIns="914400" rtlCol="0" anchor="ctr"/>
           <a:lstStyle/>
           <a:p>
-            <a:pPr algn="ctr"/>
             <a:r>
               <a:rPr lang="en-US" sz="1000" dirty="0">
                 <a:solidFill>
                   <a:srgbClr val="000000"/>
                 </a:solidFill>
               </a:rPr>
-              <a:t>1974: the median US house price was </a:t>
+              <a:t>The median US house price was </a:t>
             </a:r>
             <a:r>
               <a:rPr lang="en-US" sz="1000" b="1" dirty="0">
@@ -7332,7 +7331,15 @@
                   <a:srgbClr val="000000"/>
                 </a:solidFill>
               </a:rPr>
-              <a:t>~6.6x the US median annual income</a:t>
+              <a:t>~6.6x the US median annual income </a:t>
+            </a:r>
+            <a:r>
+              <a:rPr lang="en-US" sz="1000" dirty="0">
+                <a:solidFill>
+                  <a:srgbClr val="000000"/>
+                </a:solidFill>
+              </a:rPr>
+              <a:t>in 1974</a:t>
             </a:r>
           </a:p>
         </p:txBody>
@@ -7352,7 +7359,7 @@
         <p:spPr>
           <a:xfrm>
             <a:off x="8333293" y="1882359"/>
-            <a:ext cx="1923068" cy="602261"/>
+            <a:ext cx="3307018" cy="602261"/>
           </a:xfrm>
           <a:prstGeom prst="rect">
             <a:avLst/>
@@ -7381,17 +7388,16 @@
           </a:fontRef>
         </p:style>
         <p:txBody>
-          <a:bodyPr rtlCol="0" anchor="ctr"/>
+          <a:bodyPr lIns="914400" rtlCol="0" anchor="ctr"/>
           <a:lstStyle/>
           <a:p>
-            <a:pPr algn="ctr"/>
             <a:r>
               <a:rPr lang="en-US" sz="1000" dirty="0">
                 <a:solidFill>
                   <a:srgbClr val="000000"/>
                 </a:solidFill>
               </a:rPr>
-              <a:t>2022: the median US house price was </a:t>
+              <a:t>The median US house price was </a:t>
             </a:r>
             <a:r>
               <a:rPr lang="en-US" sz="1000" b="1" dirty="0">
@@ -7399,7 +7405,15 @@
                   <a:srgbClr val="000000"/>
                 </a:solidFill>
               </a:rPr>
-              <a:t>~10.2x the US median annual income</a:t>
+              <a:t>~10.2x the US median annual income </a:t>
+            </a:r>
+            <a:r>
+              <a:rPr lang="en-US" sz="1000" dirty="0">
+                <a:solidFill>
+                  <a:srgbClr val="000000"/>
+                </a:solidFill>
+              </a:rPr>
+              <a:t>in 2022</a:t>
             </a:r>
           </a:p>
         </p:txBody>
@@ -7473,8 +7487,8 @@
         </p:nvSpPr>
         <p:spPr>
           <a:xfrm>
-            <a:off x="8333294" y="2957104"/>
-            <a:ext cx="1923068" cy="905042"/>
+            <a:off x="8333293" y="2957104"/>
+            <a:ext cx="3307017" cy="905042"/>
           </a:xfrm>
           <a:prstGeom prst="rect">
             <a:avLst/>
@@ -7508,7 +7522,6 @@
           <a:bodyPr rtlCol="0" anchor="ctr"/>
           <a:lstStyle/>
           <a:p>
-            <a:pPr algn="ctr"/>
             <a:r>
               <a:rPr lang="en-US" sz="1000" dirty="0">
                 <a:solidFill>
@@ -7546,7 +7559,7 @@
         <p:spPr>
           <a:xfrm flipH="1">
             <a:off x="5731497" y="3409625"/>
-            <a:ext cx="2601797" cy="0"/>
+            <a:ext cx="2601796" cy="0"/>
           </a:xfrm>
           <a:prstGeom prst="straightConnector1">
             <a:avLst/>
@@ -7573,6 +7586,84 @@
           </a:fontRef>
         </p:style>
       </p:cxnSp>
+      <p:sp>
+        <p:nvSpPr>
+          <p:cNvPr id="6" name="TextBox 5">
+            <a:extLst>
+              <a:ext uri="{FF2B5EF4-FFF2-40B4-BE49-F238E27FC236}">
+                <a16:creationId xmlns:a16="http://schemas.microsoft.com/office/drawing/2014/main" id="{9C50D576-D65A-1064-6FBF-59E0E4B84DDB}"/>
+              </a:ext>
+            </a:extLst>
+          </p:cNvPr>
+          <p:cNvSpPr txBox="1"/>
+          <p:nvPr/>
+        </p:nvSpPr>
+        <p:spPr>
+          <a:xfrm>
+            <a:off x="8413778" y="2039662"/>
+            <a:ext cx="711367" cy="276999"/>
+          </a:xfrm>
+          <a:prstGeom prst="rect">
+            <a:avLst/>
+          </a:prstGeom>
+          <a:noFill/>
+        </p:spPr>
+        <p:txBody>
+          <a:bodyPr wrap="square" lIns="0" tIns="0" rIns="0" bIns="0" rtlCol="0">
+            <a:spAutoFit/>
+          </a:bodyPr>
+          <a:lstStyle/>
+          <a:p>
+            <a:r>
+              <a:rPr lang="en-US" dirty="0">
+                <a:solidFill>
+                  <a:srgbClr val="C00000"/>
+                </a:solidFill>
+              </a:rPr>
+              <a:t>~10.2x</a:t>
+            </a:r>
+          </a:p>
+        </p:txBody>
+      </p:sp>
+      <p:sp>
+        <p:nvSpPr>
+          <p:cNvPr id="9" name="TextBox 8">
+            <a:extLst>
+              <a:ext uri="{FF2B5EF4-FFF2-40B4-BE49-F238E27FC236}">
+                <a16:creationId xmlns:a16="http://schemas.microsoft.com/office/drawing/2014/main" id="{8717AE7C-C6E5-B0D0-EB86-A739B933A995}"/>
+              </a:ext>
+            </a:extLst>
+          </p:cNvPr>
+          <p:cNvSpPr txBox="1"/>
+          <p:nvPr/>
+        </p:nvSpPr>
+        <p:spPr>
+          <a:xfrm>
+            <a:off x="8413778" y="4762825"/>
+            <a:ext cx="711367" cy="276999"/>
+          </a:xfrm>
+          <a:prstGeom prst="rect">
+            <a:avLst/>
+          </a:prstGeom>
+          <a:noFill/>
+        </p:spPr>
+        <p:txBody>
+          <a:bodyPr wrap="square" lIns="0" tIns="0" rIns="0" bIns="0" rtlCol="0">
+            <a:spAutoFit/>
+          </a:bodyPr>
+          <a:lstStyle/>
+          <a:p>
+            <a:r>
+              <a:rPr lang="en-US" dirty="0">
+                <a:solidFill>
+                  <a:schemeClr val="accent1"/>
+                </a:solidFill>
+              </a:rPr>
+              <a:t>~6.6x</a:t>
+            </a:r>
+          </a:p>
+        </p:txBody>
+      </p:sp>
     </p:spTree>
     <p:extLst>
       <p:ext uri="{BB962C8B-B14F-4D97-AF65-F5344CB8AC3E}">

</xml_diff>